<commit_message>
feat: Update slide deck
</commit_message>
<xml_diff>
--- a/noircon2.pptx
+++ b/noircon2.pptx
@@ -18017,10 +18017,6 @@
           <a:bodyPr/>
           <a:lstStyle/>
           <a:p>
-            <a:r>
-              <a:rPr lang="en-US" dirty="0"/>
-              <a:t>tomorrow</a:t>
-            </a:r>
             <a:endParaRPr lang="en-AT" dirty="0"/>
           </a:p>
         </p:txBody>
@@ -18326,10 +18322,6 @@
           <a:bodyPr/>
           <a:lstStyle/>
           <a:p>
-            <a:r>
-              <a:rPr lang="en-US" dirty="0"/>
-              <a:t>tomorrow</a:t>
-            </a:r>
             <a:endParaRPr lang="en-AT" dirty="0"/>
           </a:p>
         </p:txBody>
@@ -18831,8 +18823,8 @@
           </a:p>
         </p:txBody>
       </p:sp>
-      <mc:AlternateContent xmlns:mc="http://schemas.openxmlformats.org/markup-compatibility/2006" xmlns:a14="http://schemas.microsoft.com/office/drawing/2010/main">
-        <mc:Choice Requires="a14">
+      <mc:AlternateContent xmlns:mc="http://schemas.openxmlformats.org/markup-compatibility/2006">
+        <mc:Choice xmlns:a14="http://schemas.microsoft.com/office/drawing/2010/main" Requires="a14">
           <p:sp>
             <p:nvSpPr>
               <p:cNvPr id="9" name="Content Placeholder 8">
@@ -18883,7 +18875,7 @@
                           <a:rPr lang="en-US" b="0" i="1" smtClean="0">
                             <a:latin typeface="Cambria Math" panose="02040503050406030204" pitchFamily="18" charset="0"/>
                           </a:rPr>
-                          <m:t>𝑥</m:t>
+                          <m:t>𝑋</m:t>
                         </m:r>
                       </m:e>
                     </m:d>
@@ -18978,7 +18970,7 @@
             </p:txBody>
           </p:sp>
         </mc:Choice>
-        <mc:Fallback xmlns="">
+        <mc:Fallback>
           <p:sp>
             <p:nvSpPr>
               <p:cNvPr id="9" name="Content Placeholder 8">
@@ -19834,13 +19826,15 @@
               </a:ext>
             </a:extLst>
           </p:cNvPr>
-          <p:cNvCxnSpPr/>
+          <p:cNvCxnSpPr>
+            <a:cxnSpLocks/>
+          </p:cNvCxnSpPr>
           <p:nvPr/>
         </p:nvCxnSpPr>
         <p:spPr>
-          <a:xfrm>
-            <a:off x="1019174" y="5295900"/>
-            <a:ext cx="4352926" cy="0"/>
+          <a:xfrm flipV="1">
+            <a:off x="3227387" y="3644900"/>
+            <a:ext cx="0" cy="2882900"/>
           </a:xfrm>
           <a:prstGeom prst="line">
             <a:avLst/>
@@ -27573,10 +27567,6 @@
           <a:bodyPr/>
           <a:lstStyle/>
           <a:p>
-            <a:r>
-              <a:rPr lang="en-US" dirty="0"/>
-              <a:t>tomorrow</a:t>
-            </a:r>
             <a:endParaRPr lang="en-AT" dirty="0"/>
           </a:p>
         </p:txBody>
@@ -28021,7 +28011,7 @@
           <a:bodyPr/>
           <a:lstStyle/>
           <a:p>
-            <a:endParaRPr lang="en-AT"/>
+            <a:endParaRPr lang="en-AT" dirty="0"/>
           </a:p>
         </p:txBody>
       </p:sp>
@@ -28076,10 +28066,6 @@
           <a:bodyPr/>
           <a:lstStyle/>
           <a:p>
-            <a:r>
-              <a:rPr lang="en-US" dirty="0"/>
-              <a:t>tomorrow</a:t>
-            </a:r>
             <a:endParaRPr lang="en-AT" dirty="0"/>
           </a:p>
         </p:txBody>
@@ -28565,10 +28551,6 @@
           <a:bodyPr/>
           <a:lstStyle/>
           <a:p>
-            <a:r>
-              <a:rPr lang="en-US" dirty="0"/>
-              <a:t>tomorrow</a:t>
-            </a:r>
             <a:endParaRPr lang="en-AT" dirty="0"/>
           </a:p>
         </p:txBody>
@@ -28775,7 +28757,7 @@
             <a:pPr algn="ctr"/>
             <a:r>
               <a:rPr lang="en-US" dirty="0"/>
-              <a:t>Look we have a shuffled</a:t>
+              <a:t>Look we have a shuffled deck</a:t>
             </a:r>
             <a:endParaRPr lang="en-AT" dirty="0"/>
           </a:p>
@@ -28960,10 +28942,6 @@
           <a:bodyPr/>
           <a:lstStyle/>
           <a:p>
-            <a:r>
-              <a:rPr lang="en-US" dirty="0"/>
-              <a:t>tomorrow</a:t>
-            </a:r>
             <a:endParaRPr lang="en-AT" dirty="0"/>
           </a:p>
         </p:txBody>
@@ -29170,7 +29148,7 @@
             <a:pPr algn="ctr"/>
             <a:r>
               <a:rPr lang="en-US" dirty="0"/>
-              <a:t>Look we have a shuffled</a:t>
+              <a:t>Look we have a shuffled deck</a:t>
             </a:r>
             <a:endParaRPr lang="en-AT" dirty="0"/>
           </a:p>
@@ -29763,10 +29741,6 @@
           <a:bodyPr/>
           <a:lstStyle/>
           <a:p>
-            <a:r>
-              <a:rPr lang="en-US" dirty="0"/>
-              <a:t>tomorrow</a:t>
-            </a:r>
             <a:endParaRPr lang="en-AT" dirty="0"/>
           </a:p>
         </p:txBody>
@@ -29985,10 +29959,6 @@
           <a:bodyPr/>
           <a:lstStyle/>
           <a:p>
-            <a:r>
-              <a:rPr lang="en-US" dirty="0"/>
-              <a:t>tomorrow</a:t>
-            </a:r>
             <a:endParaRPr lang="en-AT" dirty="0"/>
           </a:p>
         </p:txBody>
@@ -30218,10 +30188,6 @@
           <a:bodyPr/>
           <a:lstStyle/>
           <a:p>
-            <a:r>
-              <a:rPr lang="en-US" dirty="0"/>
-              <a:t>tomorrow</a:t>
-            </a:r>
             <a:endParaRPr lang="en-AT" dirty="0"/>
           </a:p>
         </p:txBody>
@@ -30462,10 +30428,6 @@
           <a:bodyPr/>
           <a:lstStyle/>
           <a:p>
-            <a:r>
-              <a:rPr lang="en-US" dirty="0"/>
-              <a:t>tomorrow</a:t>
-            </a:r>
             <a:endParaRPr lang="en-AT" dirty="0"/>
           </a:p>
         </p:txBody>
@@ -30806,10 +30768,6 @@
           <a:bodyPr/>
           <a:lstStyle/>
           <a:p>
-            <a:r>
-              <a:rPr lang="en-US" dirty="0"/>
-              <a:t>tomorrow</a:t>
-            </a:r>
             <a:endParaRPr lang="en-AT" dirty="0"/>
           </a:p>
         </p:txBody>
@@ -31172,10 +31130,6 @@
           <a:bodyPr/>
           <a:lstStyle/>
           <a:p>
-            <a:r>
-              <a:rPr lang="en-US" dirty="0"/>
-              <a:t>tomorrow</a:t>
-            </a:r>
             <a:endParaRPr lang="en-AT" dirty="0"/>
           </a:p>
         </p:txBody>
@@ -31382,7 +31336,7 @@
             <a:pPr algn="ctr"/>
             <a:r>
               <a:rPr lang="en-US" dirty="0"/>
-              <a:t>Look we have a shuffled</a:t>
+              <a:t>Look we have a shuffled deck</a:t>
             </a:r>
             <a:endParaRPr lang="en-AT" dirty="0"/>
           </a:p>
@@ -31639,10 +31593,6 @@
           <a:bodyPr/>
           <a:lstStyle/>
           <a:p>
-            <a:r>
-              <a:rPr lang="en-US" dirty="0"/>
-              <a:t>tomorrow</a:t>
-            </a:r>
             <a:endParaRPr lang="en-AT" dirty="0"/>
           </a:p>
         </p:txBody>
@@ -31849,7 +31799,7 @@
             <a:pPr algn="ctr"/>
             <a:r>
               <a:rPr lang="en-US" dirty="0"/>
-              <a:t>Look we have a shuffled</a:t>
+              <a:t>Look we have a shuffled deck</a:t>
             </a:r>
             <a:endParaRPr lang="en-AT" dirty="0"/>
           </a:p>
@@ -32156,10 +32106,6 @@
           <a:bodyPr/>
           <a:lstStyle/>
           <a:p>
-            <a:r>
-              <a:rPr lang="en-US" dirty="0"/>
-              <a:t>tomorrow</a:t>
-            </a:r>
             <a:endParaRPr lang="en-AT" dirty="0"/>
           </a:p>
         </p:txBody>
@@ -32669,10 +32615,6 @@
           <a:bodyPr/>
           <a:lstStyle/>
           <a:p>
-            <a:r>
-              <a:rPr lang="en-US" dirty="0"/>
-              <a:t>tomorrow</a:t>
-            </a:r>
             <a:endParaRPr lang="en-AT" dirty="0"/>
           </a:p>
         </p:txBody>
@@ -33169,7 +33111,7 @@
             <a:pPr algn="ctr"/>
             <a:r>
               <a:rPr lang="en-US" dirty="0"/>
-              <a:t>I don’t like r1, lets take r5</a:t>
+              <a:t>I don’t like r1, let’s take r5</a:t>
             </a:r>
             <a:endParaRPr lang="en-AT" dirty="0"/>
           </a:p>
@@ -33400,10 +33342,6 @@
           <a:bodyPr/>
           <a:lstStyle/>
           <a:p>
-            <a:r>
-              <a:rPr lang="en-US" dirty="0"/>
-              <a:t>tomorrow</a:t>
-            </a:r>
             <a:endParaRPr lang="en-AT" dirty="0"/>
           </a:p>
         </p:txBody>
@@ -33797,8 +33735,12 @@
           <a:lstStyle/>
           <a:p>
             <a:r>
+              <a:rPr lang="en-US" dirty="0" err="1"/>
+              <a:t>UltraHonk</a:t>
+            </a:r>
+            <a:r>
               <a:rPr lang="en-US" dirty="0"/>
-              <a:t>UH-flavor with recursion</a:t>
+              <a:t> Proof System</a:t>
             </a:r>
             <a:endParaRPr lang="en-AT" dirty="0"/>
           </a:p>
@@ -33827,7 +33769,11 @@
           <a:p>
             <a:r>
               <a:rPr lang="en-US" dirty="0"/>
-              <a:t>MH-flavor with Client-IVC</a:t>
+              <a:t>Full </a:t>
+            </a:r>
+            <a:r>
+              <a:rPr lang="en-US"/>
+              <a:t>Client-IVC Proof System</a:t>
             </a:r>
             <a:endParaRPr lang="en-AT" dirty="0"/>
           </a:p>
@@ -33870,7 +33816,7 @@
             </a:pPr>
             <a:r>
               <a:rPr lang="en-US" dirty="0"/>
-              <a:t>Create Aztec keys that are secret-shared that owns Private State</a:t>
+              <a:t>Create Aztec keys that are secret-shared and own Private State</a:t>
             </a:r>
             <a:endParaRPr lang="en-AT" dirty="0"/>
           </a:p>
@@ -33999,6 +33945,23 @@
               <a:rPr lang="en-US" dirty="0" err="1"/>
               <a:t>coNoir</a:t>
             </a:r>
+            <a:endParaRPr lang="en-US" dirty="0"/>
+          </a:p>
+          <a:p>
+            <a:pPr marL="342900" indent="-342900">
+              <a:buFont typeface="Arial" panose="020B0604020202020204" pitchFamily="34" charset="0"/>
+              <a:buChar char="•"/>
+            </a:pPr>
+            <a:r>
+              <a:rPr lang="en-US" dirty="0"/>
+              <a:t>Recurse into smart contract</a:t>
+            </a:r>
+          </a:p>
+          <a:p>
+            <a:pPr marL="342900" indent="-342900">
+              <a:buFont typeface="Arial" panose="020B0604020202020204" pitchFamily="34" charset="0"/>
+              <a:buChar char="•"/>
+            </a:pPr>
             <a:endParaRPr lang="en-US" dirty="0"/>
           </a:p>
         </p:txBody>
@@ -34025,7 +33988,7 @@
         </p:blipFill>
         <p:spPr>
           <a:xfrm>
-            <a:off x="1395751" y="3543035"/>
+            <a:off x="1364001" y="4076435"/>
             <a:ext cx="3093988" cy="2049958"/>
           </a:xfrm>
           <a:prstGeom prst="rect">
@@ -34185,10 +34148,6 @@
           <a:bodyPr/>
           <a:lstStyle/>
           <a:p>
-            <a:r>
-              <a:rPr lang="en-US" dirty="0"/>
-              <a:t>tomorrow</a:t>
-            </a:r>
             <a:endParaRPr lang="en-AT" dirty="0"/>
           </a:p>
         </p:txBody>
@@ -34458,10 +34417,6 @@
           <a:bodyPr/>
           <a:lstStyle/>
           <a:p>
-            <a:r>
-              <a:rPr lang="en-US" dirty="0"/>
-              <a:t>tomorrow</a:t>
-            </a:r>
             <a:endParaRPr lang="en-AT" dirty="0"/>
           </a:p>
         </p:txBody>
@@ -34731,10 +34686,6 @@
           <a:bodyPr/>
           <a:lstStyle/>
           <a:p>
-            <a:r>
-              <a:rPr lang="en-US" dirty="0"/>
-              <a:t>tomorrow</a:t>
-            </a:r>
             <a:endParaRPr lang="en-AT" dirty="0"/>
           </a:p>
         </p:txBody>
@@ -35034,10 +34985,6 @@
           <a:bodyPr/>
           <a:lstStyle/>
           <a:p>
-            <a:r>
-              <a:rPr lang="en-US" dirty="0"/>
-              <a:t>tomorrow</a:t>
-            </a:r>
             <a:endParaRPr lang="en-AT" dirty="0"/>
           </a:p>
         </p:txBody>
@@ -35343,10 +35290,6 @@
           <a:bodyPr/>
           <a:lstStyle/>
           <a:p>
-            <a:r>
-              <a:rPr lang="en-US" dirty="0"/>
-              <a:t>tomorrow</a:t>
-            </a:r>
             <a:endParaRPr lang="en-AT" dirty="0"/>
           </a:p>
         </p:txBody>
@@ -36133,12 +36076,21 @@
 </file>
 
 <file path=customXml/item1.xml><?xml version="1.0" encoding="utf-8"?>
+<?mso-contentType ?>
+<FormTemplates xmlns="http://schemas.microsoft.com/sharepoint/v3/contenttype/forms">
+  <Display>DocumentLibraryForm</Display>
+  <Edit>DocumentLibraryForm</Edit>
+  <New>DocumentLibraryForm</New>
+</FormTemplates>
+</file>
+
+<file path=customXml/item2.xml><?xml version="1.0" encoding="utf-8"?>
 <p:properties xmlns:p="http://schemas.microsoft.com/office/2006/metadata/properties" xmlns:xsi="http://www.w3.org/2001/XMLSchema-instance" xmlns:pc="http://schemas.microsoft.com/office/infopath/2007/PartnerControls">
   <documentManagement/>
 </p:properties>
 </file>
 
-<file path=customXml/item2.xml><?xml version="1.0" encoding="utf-8"?>
+<file path=customXml/item3.xml><?xml version="1.0" encoding="utf-8"?>
 <ct:contentTypeSchema xmlns:ct="http://schemas.microsoft.com/office/2006/metadata/contentType" xmlns:ma="http://schemas.microsoft.com/office/2006/metadata/properties/metaAttributes" ct:_="" ma:_="" ma:contentTypeName="Dokument" ma:contentTypeID="0x0101007AE31D6890E57049A6F30985FF5AE52B" ma:contentTypeVersion="4" ma:contentTypeDescription="Ein neues Dokument erstellen." ma:contentTypeScope="" ma:versionID="39fb75c457022c17c3fff9032c392070">
   <xsd:schema xmlns:xsd="http://www.w3.org/2001/XMLSchema" xmlns:xs="http://www.w3.org/2001/XMLSchema" xmlns:p="http://schemas.microsoft.com/office/2006/metadata/properties" xmlns:ns2="bcb743ee-2fe3-4dc1-81a8-33ee124c2c17" targetNamespace="http://schemas.microsoft.com/office/2006/metadata/properties" ma:root="true" ma:fieldsID="ee9d33d3a7e47c9ba9a79aae7501dabe" ns2:_="">
     <xsd:import namespace="bcb743ee-2fe3-4dc1-81a8-33ee124c2c17"/>
@@ -36282,16 +36234,15 @@
 </ct:contentTypeSchema>
 </file>
 
-<file path=customXml/item3.xml><?xml version="1.0" encoding="utf-8"?>
-<?mso-contentType ?>
-<FormTemplates xmlns="http://schemas.microsoft.com/sharepoint/v3/contenttype/forms">
-  <Display>DocumentLibraryForm</Display>
-  <Edit>DocumentLibraryForm</Edit>
-  <New>DocumentLibraryForm</New>
-</FormTemplates>
+<file path=customXml/itemProps1.xml><?xml version="1.0" encoding="utf-8"?>
+<ds:datastoreItem xmlns:ds="http://schemas.openxmlformats.org/officeDocument/2006/customXml" ds:itemID="{F60D841F-1F5F-41F4-8F0F-1C4CB9BD44BE}">
+  <ds:schemaRefs>
+    <ds:schemaRef ds:uri="http://schemas.microsoft.com/sharepoint/v3/contenttype/forms"/>
+  </ds:schemaRefs>
+</ds:datastoreItem>
 </file>
 
-<file path=customXml/itemProps1.xml><?xml version="1.0" encoding="utf-8"?>
+<file path=customXml/itemProps2.xml><?xml version="1.0" encoding="utf-8"?>
 <ds:datastoreItem xmlns:ds="http://schemas.openxmlformats.org/officeDocument/2006/customXml" ds:itemID="{0A536E90-3CE2-42FE-8608-A759BBFF40BF}">
   <ds:schemaRefs>
     <ds:schemaRef ds:uri="http://schemas.microsoft.com/office/2006/documentManagement/types"/>
@@ -36307,7 +36258,7 @@
 </ds:datastoreItem>
 </file>
 
-<file path=customXml/itemProps2.xml><?xml version="1.0" encoding="utf-8"?>
+<file path=customXml/itemProps3.xml><?xml version="1.0" encoding="utf-8"?>
 <ds:datastoreItem xmlns:ds="http://schemas.openxmlformats.org/officeDocument/2006/customXml" ds:itemID="{9D611A58-0219-4F40-A378-85105A6F1BDC}">
   <ds:schemaRefs>
     <ds:schemaRef ds:uri="http://schemas.microsoft.com/office/2006/metadata/contentType"/>
@@ -36323,12 +36274,4 @@
     <ds:schemaRef ds:uri="http://schemas.microsoft.com/internal/obd"/>
   </ds:schemaRefs>
 </ds:datastoreItem>
-</file>
-
-<file path=customXml/itemProps3.xml><?xml version="1.0" encoding="utf-8"?>
-<ds:datastoreItem xmlns:ds="http://schemas.openxmlformats.org/officeDocument/2006/customXml" ds:itemID="{F60D841F-1F5F-41F4-8F0F-1C4CB9BD44BE}">
-  <ds:schemaRefs>
-    <ds:schemaRef ds:uri="http://schemas.microsoft.com/sharepoint/v3/contenttype/forms"/>
-  </ds:schemaRefs>
-</ds:datastoreItem>
 </file>
</xml_diff>